<commit_message>
Alterações na apresentação para 11/04. Seleccionar palavras erradas: O professor selecciona as palavras que o aluno leu mal e estas ficam marcadas a vermelho.
</commit_message>
<xml_diff>
--- a/Letrinhas 0.2.pptx
+++ b/Letrinhas 0.2.pptx
@@ -5,7 +5,7 @@
     <p:sldMasterId id="2147483804" r:id="rId1"/>
   </p:sldMasterIdLst>
   <p:notesMasterIdLst>
-    <p:notesMasterId r:id="rId12"/>
+    <p:notesMasterId r:id="rId11"/>
   </p:notesMasterIdLst>
   <p:sldIdLst>
     <p:sldId id="256" r:id="rId2"/>
@@ -16,8 +16,7 @@
     <p:sldId id="263" r:id="rId7"/>
     <p:sldId id="259" r:id="rId8"/>
     <p:sldId id="265" r:id="rId9"/>
-    <p:sldId id="270" r:id="rId10"/>
-    <p:sldId id="266" r:id="rId11"/>
+    <p:sldId id="266" r:id="rId10"/>
   </p:sldIdLst>
   <p:sldSz cx="9144000" cy="6858000" type="screen4x3"/>
   <p:notesSz cx="6858000" cy="9144000"/>
@@ -201,7 +200,7 @@
           <a:p>
             <a:fld id="{7F094FD5-F727-4538-979E-CCA5B9FBBEC2}" type="datetimeFigureOut">
               <a:rPr lang="pt-PT" smtClean="0"/>
-              <a:t>10/04/2014</a:t>
+              <a:t>11/04/2014</a:t>
             </a:fld>
             <a:endParaRPr lang="pt-PT"/>
           </a:p>
@@ -362,13 +361,18 @@
           <a:p>
             <a:fld id="{3FC6EC3B-BBC5-4896-93EE-BBA571DC0AE2}" type="slidenum">
               <a:rPr lang="pt-PT" smtClean="0"/>
-              <a:t>‹#›</a:t>
+              <a:t>‹nº›</a:t>
             </a:fld>
             <a:endParaRPr lang="pt-PT"/>
           </a:p>
         </p:txBody>
       </p:sp>
     </p:spTree>
+    <p:extLst>
+      <p:ext uri="{BB962C8B-B14F-4D97-AF65-F5344CB8AC3E}">
+        <p14:creationId xmlns:p14="http://schemas.microsoft.com/office/powerpoint/2010/main" val="138930720"/>
+      </p:ext>
+    </p:extLst>
   </p:cSld>
   <p:clrMap bg1="lt1" tx1="dk1" bg2="lt2" tx2="dk2" accent1="accent1" accent2="accent2" accent3="accent3" accent4="accent4" accent5="accent5" accent6="accent6" hlink="hlink" folHlink="folHlink"/>
   <p:notesStyle>
@@ -755,7 +759,7 @@
             <a:fld id="{C7C07E6F-C202-45DB-B271-3691A96DB90B}" type="datetimeFigureOut">
               <a:rPr lang="pt-PT" smtClean="0"/>
               <a:pPr/>
-              <a:t>10/04/2014</a:t>
+              <a:t>11/04/2014</a:t>
             </a:fld>
             <a:endParaRPr lang="pt-PT"/>
           </a:p>
@@ -795,7 +799,7 @@
             <a:fld id="{E72D8762-0048-4463-BB55-DBEE29A1CDAB}" type="slidenum">
               <a:rPr lang="pt-PT" smtClean="0"/>
               <a:pPr/>
-              <a:t>‹#›</a:t>
+              <a:t>‹nº›</a:t>
             </a:fld>
             <a:endParaRPr lang="pt-PT"/>
           </a:p>
@@ -951,7 +955,7 @@
             <a:fld id="{C7C07E6F-C202-45DB-B271-3691A96DB90B}" type="datetimeFigureOut">
               <a:rPr lang="pt-PT" smtClean="0"/>
               <a:pPr/>
-              <a:t>10/04/2014</a:t>
+              <a:t>11/04/2014</a:t>
             </a:fld>
             <a:endParaRPr lang="pt-PT"/>
           </a:p>
@@ -998,7 +1002,7 @@
             <a:fld id="{E72D8762-0048-4463-BB55-DBEE29A1CDAB}" type="slidenum">
               <a:rPr lang="pt-PT" smtClean="0"/>
               <a:pPr/>
-              <a:t>‹#›</a:t>
+              <a:t>‹nº›</a:t>
             </a:fld>
             <a:endParaRPr lang="pt-PT"/>
           </a:p>
@@ -1141,7 +1145,7 @@
             <a:fld id="{C7C07E6F-C202-45DB-B271-3691A96DB90B}" type="datetimeFigureOut">
               <a:rPr lang="pt-PT" smtClean="0"/>
               <a:pPr/>
-              <a:t>10/04/2014</a:t>
+              <a:t>11/04/2014</a:t>
             </a:fld>
             <a:endParaRPr lang="pt-PT"/>
           </a:p>
@@ -1188,7 +1192,7 @@
             <a:fld id="{E72D8762-0048-4463-BB55-DBEE29A1CDAB}" type="slidenum">
               <a:rPr lang="pt-PT" smtClean="0"/>
               <a:pPr/>
-              <a:t>‹#›</a:t>
+              <a:t>‹nº›</a:t>
             </a:fld>
             <a:endParaRPr lang="pt-PT"/>
           </a:p>
@@ -1372,7 +1376,7 @@
             <a:fld id="{C7C07E6F-C202-45DB-B271-3691A96DB90B}" type="datetimeFigureOut">
               <a:rPr lang="pt-PT" smtClean="0"/>
               <a:pPr/>
-              <a:t>10/04/2014</a:t>
+              <a:t>11/04/2014</a:t>
             </a:fld>
             <a:endParaRPr lang="pt-PT"/>
           </a:p>
@@ -1419,7 +1423,7 @@
             <a:fld id="{E72D8762-0048-4463-BB55-DBEE29A1CDAB}" type="slidenum">
               <a:rPr lang="pt-PT" smtClean="0"/>
               <a:pPr/>
-              <a:t>‹#›</a:t>
+              <a:t>‹nº›</a:t>
             </a:fld>
             <a:endParaRPr lang="pt-PT"/>
           </a:p>
@@ -1655,7 +1659,7 @@
             <a:fld id="{C7C07E6F-C202-45DB-B271-3691A96DB90B}" type="datetimeFigureOut">
               <a:rPr lang="pt-PT" smtClean="0"/>
               <a:pPr/>
-              <a:t>10/04/2014</a:t>
+              <a:t>11/04/2014</a:t>
             </a:fld>
             <a:endParaRPr lang="pt-PT"/>
           </a:p>
@@ -1695,7 +1699,7 @@
             <a:fld id="{E72D8762-0048-4463-BB55-DBEE29A1CDAB}" type="slidenum">
               <a:rPr lang="pt-PT" smtClean="0"/>
               <a:pPr/>
-              <a:t>‹#›</a:t>
+              <a:t>‹nº›</a:t>
             </a:fld>
             <a:endParaRPr lang="pt-PT"/>
           </a:p>
@@ -1945,7 +1949,7 @@
             <a:fld id="{C7C07E6F-C202-45DB-B271-3691A96DB90B}" type="datetimeFigureOut">
               <a:rPr lang="pt-PT" smtClean="0"/>
               <a:pPr/>
-              <a:t>10/04/2014</a:t>
+              <a:t>11/04/2014</a:t>
             </a:fld>
             <a:endParaRPr lang="pt-PT"/>
           </a:p>
@@ -1997,7 +2001,7 @@
             <a:fld id="{E72D8762-0048-4463-BB55-DBEE29A1CDAB}" type="slidenum">
               <a:rPr lang="pt-PT" smtClean="0"/>
               <a:pPr/>
-              <a:t>‹#›</a:t>
+              <a:t>‹nº›</a:t>
             </a:fld>
             <a:endParaRPr lang="pt-PT"/>
           </a:p>
@@ -2501,7 +2505,7 @@
             <a:fld id="{C7C07E6F-C202-45DB-B271-3691A96DB90B}" type="datetimeFigureOut">
               <a:rPr lang="pt-PT" smtClean="0"/>
               <a:pPr/>
-              <a:t>10/04/2014</a:t>
+              <a:t>11/04/2014</a:t>
             </a:fld>
             <a:endParaRPr lang="pt-PT"/>
           </a:p>
@@ -2553,7 +2557,7 @@
             <a:fld id="{E72D8762-0048-4463-BB55-DBEE29A1CDAB}" type="slidenum">
               <a:rPr lang="pt-PT" smtClean="0"/>
               <a:pPr/>
-              <a:t>‹#›</a:t>
+              <a:t>‹nº›</a:t>
             </a:fld>
             <a:endParaRPr lang="pt-PT"/>
           </a:p>
@@ -2634,7 +2638,7 @@
             <a:fld id="{C7C07E6F-C202-45DB-B271-3691A96DB90B}" type="datetimeFigureOut">
               <a:rPr lang="pt-PT" smtClean="0"/>
               <a:pPr/>
-              <a:t>10/04/2014</a:t>
+              <a:t>11/04/2014</a:t>
             </a:fld>
             <a:endParaRPr lang="pt-PT"/>
           </a:p>
@@ -2681,7 +2685,7 @@
             <a:fld id="{E72D8762-0048-4463-BB55-DBEE29A1CDAB}" type="slidenum">
               <a:rPr lang="pt-PT" smtClean="0"/>
               <a:pPr/>
-              <a:t>‹#›</a:t>
+              <a:t>‹nº›</a:t>
             </a:fld>
             <a:endParaRPr lang="pt-PT"/>
           </a:p>
@@ -2786,7 +2790,7 @@
             <a:fld id="{C7C07E6F-C202-45DB-B271-3691A96DB90B}" type="datetimeFigureOut">
               <a:rPr lang="pt-PT" smtClean="0"/>
               <a:pPr/>
-              <a:t>10/04/2014</a:t>
+              <a:t>11/04/2014</a:t>
             </a:fld>
             <a:endParaRPr lang="pt-PT"/>
           </a:p>
@@ -2833,7 +2837,7 @@
             <a:fld id="{E72D8762-0048-4463-BB55-DBEE29A1CDAB}" type="slidenum">
               <a:rPr lang="pt-PT" smtClean="0"/>
               <a:pPr/>
-              <a:t>‹#›</a:t>
+              <a:t>‹nº›</a:t>
             </a:fld>
             <a:endParaRPr lang="pt-PT"/>
           </a:p>
@@ -3109,7 +3113,7 @@
             <a:fld id="{C7C07E6F-C202-45DB-B271-3691A96DB90B}" type="datetimeFigureOut">
               <a:rPr lang="pt-PT" smtClean="0"/>
               <a:pPr/>
-              <a:t>10/04/2014</a:t>
+              <a:t>11/04/2014</a:t>
             </a:fld>
             <a:endParaRPr lang="pt-PT"/>
           </a:p>
@@ -3149,7 +3153,7 @@
             <a:fld id="{E72D8762-0048-4463-BB55-DBEE29A1CDAB}" type="slidenum">
               <a:rPr lang="pt-PT" smtClean="0"/>
               <a:pPr/>
-              <a:t>‹#›</a:t>
+              <a:t>‹nº›</a:t>
             </a:fld>
             <a:endParaRPr lang="pt-PT"/>
           </a:p>
@@ -3408,7 +3412,7 @@
             <a:fld id="{C7C07E6F-C202-45DB-B271-3691A96DB90B}" type="datetimeFigureOut">
               <a:rPr lang="pt-PT" smtClean="0"/>
               <a:pPr/>
-              <a:t>10/04/2014</a:t>
+              <a:t>11/04/2014</a:t>
             </a:fld>
             <a:endParaRPr lang="pt-PT"/>
           </a:p>
@@ -3448,7 +3452,7 @@
             <a:fld id="{E72D8762-0048-4463-BB55-DBEE29A1CDAB}" type="slidenum">
               <a:rPr lang="pt-PT" smtClean="0"/>
               <a:pPr/>
-              <a:t>‹#›</a:t>
+              <a:t>‹nº›</a:t>
             </a:fld>
             <a:endParaRPr lang="pt-PT"/>
           </a:p>
@@ -3655,7 +3659,7 @@
             <a:fld id="{C7C07E6F-C202-45DB-B271-3691A96DB90B}" type="datetimeFigureOut">
               <a:rPr lang="pt-PT" smtClean="0"/>
               <a:pPr/>
-              <a:t>10/04/2014</a:t>
+              <a:t>11/04/2014</a:t>
             </a:fld>
             <a:endParaRPr lang="pt-PT"/>
           </a:p>
@@ -3699,7 +3703,7 @@
             <a:fld id="{E72D8762-0048-4463-BB55-DBEE29A1CDAB}" type="slidenum">
               <a:rPr lang="pt-PT" smtClean="0"/>
               <a:pPr/>
-              <a:t>‹#›</a:t>
+              <a:t>‹nº›</a:t>
             </a:fld>
             <a:endParaRPr lang="pt-PT"/>
           </a:p>
@@ -4169,11 +4173,7 @@
             <a:pPr algn="ctr"/>
             <a:r>
               <a:rPr lang="pt-PT" sz="9600" dirty="0" smtClean="0"/>
-              <a:t>Letrinhas </a:t>
-            </a:r>
-            <a:r>
-              <a:rPr lang="pt-PT" sz="9600" dirty="0" smtClean="0"/>
-              <a:t>0.2</a:t>
+              <a:t>Letrinhas 0.2</a:t>
             </a:r>
             <a:endParaRPr lang="pt-PT" sz="9600" dirty="0"/>
           </a:p>
@@ -4224,11 +4224,7 @@
           <a:p>
             <a:r>
               <a:rPr lang="pt-PT" sz="1800" dirty="0" smtClean="0"/>
-              <a:t>Tiago </a:t>
-            </a:r>
-            <a:r>
-              <a:rPr lang="pt-PT" sz="1800" dirty="0" smtClean="0"/>
-              <a:t>Fernandes  17253</a:t>
+              <a:t>Tiago Fernandes  17253</a:t>
             </a:r>
           </a:p>
           <a:p>
@@ -4289,193 +4285,6 @@
           </a:prstGeom>
         </p:spPr>
       </p:pic>
-    </p:spTree>
-  </p:cSld>
-  <p:clrMapOvr>
-    <a:masterClrMapping/>
-  </p:clrMapOvr>
-  <p:timing>
-    <p:tnLst>
-      <p:par>
-        <p:cTn id="1" dur="indefinite" restart="never" nodeType="tmRoot"/>
-      </p:par>
-    </p:tnLst>
-  </p:timing>
-</p:sld>
-</file>
-
-<file path=ppt/slides/slide10.xml><?xml version="1.0" encoding="utf-8"?>
-<p:sld xmlns:a="http://schemas.openxmlformats.org/drawingml/2006/main" xmlns:r="http://schemas.openxmlformats.org/officeDocument/2006/relationships" xmlns:p="http://schemas.openxmlformats.org/presentationml/2006/main">
-  <p:cSld>
-    <p:spTree>
-      <p:nvGrpSpPr>
-        <p:cNvPr id="1" name=""/>
-        <p:cNvGrpSpPr/>
-        <p:nvPr/>
-      </p:nvGrpSpPr>
-      <p:grpSpPr>
-        <a:xfrm>
-          <a:off x="0" y="0"/>
-          <a:ext cx="0" cy="0"/>
-          <a:chOff x="0" y="0"/>
-          <a:chExt cx="0" cy="0"/>
-        </a:xfrm>
-      </p:grpSpPr>
-      <p:sp>
-        <p:nvSpPr>
-          <p:cNvPr id="4" name="TextBox 3"/>
-          <p:cNvSpPr txBox="1"/>
-          <p:nvPr/>
-        </p:nvSpPr>
-        <p:spPr>
-          <a:xfrm>
-            <a:off x="683568" y="1578272"/>
-            <a:ext cx="7128792" cy="4708981"/>
-          </a:xfrm>
-          <a:prstGeom prst="rect">
-            <a:avLst/>
-          </a:prstGeom>
-          <a:noFill/>
-        </p:spPr>
-        <p:txBody>
-          <a:bodyPr wrap="square" rtlCol="0">
-            <a:spAutoFit/>
-          </a:bodyPr>
-          <a:lstStyle/>
-          <a:p>
-            <a:endParaRPr lang="pt-PT" dirty="0" smtClean="0"/>
-          </a:p>
-          <a:p>
-            <a:pPr>
-              <a:buFont typeface="Arial" pitchFamily="34" charset="0"/>
-              <a:buChar char="•"/>
-            </a:pPr>
-            <a:r>
-              <a:rPr lang="pt-PT" sz="2400" dirty="0" smtClean="0"/>
-              <a:t> </a:t>
-            </a:r>
-            <a:r>
-              <a:rPr lang="pt-PT" sz="2400" dirty="0" smtClean="0"/>
-              <a:t>Mais tipos de testes</a:t>
-            </a:r>
-          </a:p>
-          <a:p>
-            <a:pPr>
-              <a:buFont typeface="Arial" pitchFamily="34" charset="0"/>
-              <a:buChar char="•"/>
-            </a:pPr>
-            <a:r>
-              <a:rPr lang="pt-PT" sz="2400" dirty="0" smtClean="0"/>
-              <a:t>Sincronização das BD’s</a:t>
-            </a:r>
-          </a:p>
-          <a:p>
-            <a:pPr>
-              <a:buFont typeface="Arial" pitchFamily="34" charset="0"/>
-              <a:buChar char="•"/>
-            </a:pPr>
-            <a:r>
-              <a:rPr lang="pt-PT" sz="2400" dirty="0" smtClean="0"/>
-              <a:t>Guradar testes na BD Android</a:t>
-            </a:r>
-          </a:p>
-          <a:p>
-            <a:pPr>
-              <a:buFont typeface="Arial" pitchFamily="34" charset="0"/>
-              <a:buChar char="•"/>
-            </a:pPr>
-            <a:r>
-              <a:rPr lang="pt-PT" sz="2400" dirty="0" smtClean="0"/>
-              <a:t>Guardar resolução dos testes no Android</a:t>
-            </a:r>
-          </a:p>
-          <a:p>
-            <a:pPr>
-              <a:buFont typeface="Arial" pitchFamily="34" charset="0"/>
-              <a:buChar char="•"/>
-            </a:pPr>
-            <a:r>
-              <a:rPr lang="pt-PT" sz="2400" dirty="0" smtClean="0"/>
-              <a:t>Aceder as resoluções dos testes efectuados pelos alunos em modo professor</a:t>
-            </a:r>
-          </a:p>
-          <a:p>
-            <a:pPr>
-              <a:buFont typeface="Arial" pitchFamily="34" charset="0"/>
-              <a:buChar char="•"/>
-            </a:pPr>
-            <a:r>
-              <a:rPr lang="pt-PT" sz="2400" dirty="0" smtClean="0"/>
-              <a:t>Desenvolver uma classe para o calculo de avaliação</a:t>
-            </a:r>
-          </a:p>
-          <a:p>
-            <a:pPr>
-              <a:buFont typeface="Arial" pitchFamily="34" charset="0"/>
-              <a:buChar char="•"/>
-            </a:pPr>
-            <a:r>
-              <a:rPr lang="pt-PT" sz="2400" dirty="0" smtClean="0"/>
-              <a:t>Autenticação</a:t>
-            </a:r>
-          </a:p>
-          <a:p>
-            <a:pPr>
-              <a:buFont typeface="Arial" pitchFamily="34" charset="0"/>
-              <a:buChar char="•"/>
-            </a:pPr>
-            <a:r>
-              <a:rPr lang="pt-PT" sz="2400" smtClean="0"/>
-              <a:t>…</a:t>
-            </a:r>
-            <a:endParaRPr lang="pt-PT" sz="2400" dirty="0" smtClean="0"/>
-          </a:p>
-          <a:p>
-            <a:pPr>
-              <a:buFont typeface="Arial" pitchFamily="34" charset="0"/>
-              <a:buChar char="•"/>
-            </a:pPr>
-            <a:endParaRPr lang="pt-PT" sz="2400" dirty="0" smtClean="0"/>
-          </a:p>
-          <a:p>
-            <a:pPr>
-              <a:buFont typeface="Arial" pitchFamily="34" charset="0"/>
-              <a:buChar char="•"/>
-            </a:pPr>
-            <a:endParaRPr lang="pt-PT" dirty="0"/>
-          </a:p>
-        </p:txBody>
-      </p:sp>
-      <p:sp>
-        <p:nvSpPr>
-          <p:cNvPr id="5" name="Title 1"/>
-          <p:cNvSpPr>
-            <a:spLocks noGrp="1"/>
-          </p:cNvSpPr>
-          <p:nvPr>
-            <p:ph type="title"/>
-          </p:nvPr>
-        </p:nvSpPr>
-        <p:spPr>
-          <a:xfrm>
-            <a:off x="457200" y="253536"/>
-            <a:ext cx="8229600" cy="1143000"/>
-          </a:xfrm>
-        </p:spPr>
-        <p:txBody>
-          <a:bodyPr>
-            <a:normAutofit fontScale="90000"/>
-          </a:bodyPr>
-          <a:lstStyle/>
-          <a:p>
-            <a:r>
-              <a:rPr lang="pt-PT" dirty="0" smtClean="0"/>
-              <a:t>Funcionalidades para concluir e desenvolver para a versão 0.3</a:t>
-            </a:r>
-            <a:endParaRPr lang="pt-PT" dirty="0"/>
-          </a:p>
-        </p:txBody>
-      </p:sp>
     </p:spTree>
   </p:cSld>
   <p:clrMapOvr>
@@ -4621,7 +4430,6 @@
               <a:rPr lang="pt-PT" sz="3000" dirty="0" smtClean="0"/>
               <a:t>Correção do teste normal no modo professor</a:t>
             </a:r>
-            <a:endParaRPr lang="pt-PT" sz="3000" dirty="0" smtClean="0"/>
           </a:p>
           <a:p>
             <a:endParaRPr lang="pt-PT" dirty="0" smtClean="0"/>
@@ -5417,11 +5225,7 @@
           <a:p>
             <a:r>
               <a:rPr lang="pt-PT" dirty="0" smtClean="0"/>
-              <a:t>O aluno clica em </a:t>
-            </a:r>
-            <a:r>
-              <a:rPr lang="pt-PT" dirty="0" smtClean="0"/>
-              <a:t>“</a:t>
+              <a:t>O aluno clica em “</a:t>
             </a:r>
             <a:r>
               <a:rPr lang="pt-PT" dirty="0" smtClean="0">
@@ -5496,64 +5300,52 @@
           </a:p>
         </p:txBody>
       </p:sp>
-      <p:pic>
-        <p:nvPicPr>
-          <p:cNvPr id="6" name="Picture 5" descr="Screenshot_2014-04-10-15-26-30.png"/>
-          <p:cNvPicPr>
-            <a:picLocks noChangeAspect="1"/>
-          </p:cNvPicPr>
+      <p:sp>
+        <p:nvSpPr>
+          <p:cNvPr id="10" name="TextBox 9"/>
+          <p:cNvSpPr txBox="1"/>
           <p:nvPr/>
-        </p:nvPicPr>
-        <p:blipFill>
-          <a:blip r:embed="rId2" cstate="print"/>
-          <a:stretch>
-            <a:fillRect/>
-          </a:stretch>
-        </p:blipFill>
-        <p:spPr>
-          <a:xfrm>
-            <a:off x="539553" y="1484784"/>
-            <a:ext cx="2592288" cy="4320480"/>
+        </p:nvSpPr>
+        <p:spPr>
+          <a:xfrm>
+            <a:off x="539552" y="5949280"/>
+            <a:ext cx="5693418" cy="369332"/>
           </a:xfrm>
           <a:prstGeom prst="rect">
             <a:avLst/>
           </a:prstGeom>
-        </p:spPr>
-      </p:pic>
+          <a:noFill/>
+        </p:spPr>
+        <p:txBody>
+          <a:bodyPr wrap="none" rtlCol="0">
+            <a:spAutoFit/>
+          </a:bodyPr>
+          <a:lstStyle/>
+          <a:p>
+            <a:r>
+              <a:rPr lang="pt-PT" dirty="0" smtClean="0"/>
+              <a:t>Selecionar palavras lidas incorretamente pelo aluno</a:t>
+            </a:r>
+            <a:endParaRPr lang="pt-PT" dirty="0"/>
+          </a:p>
+        </p:txBody>
+      </p:sp>
       <p:pic>
         <p:nvPicPr>
-          <p:cNvPr id="9" name="Picture 8" descr="Screenshot_2014-04-10-15-26-38.png"/>
-          <p:cNvPicPr>
-            <a:picLocks noChangeAspect="1"/>
-          </p:cNvPicPr>
-          <p:nvPr/>
-        </p:nvPicPr>
-        <p:blipFill>
-          <a:blip r:embed="rId3" cstate="print"/>
-          <a:stretch>
-            <a:fillRect/>
-          </a:stretch>
-        </p:blipFill>
-        <p:spPr>
-          <a:xfrm>
-            <a:off x="3203848" y="1484784"/>
-            <a:ext cx="2592288" cy="4320480"/>
-          </a:xfrm>
-          <a:prstGeom prst="rect">
-            <a:avLst/>
-          </a:prstGeom>
-        </p:spPr>
-      </p:pic>
-      <p:pic>
-        <p:nvPicPr>
-          <p:cNvPr id="1026" name="Picture 2" descr="C:\Users\DiogoNetoConceição\estt\PSI\ApresentaçãoApp0.2\printScreens0.2\Screenshot_2014-04-10-15-26-51.png"/>
+          <p:cNvPr id="1028" name="Picture 4" descr="C:\Users\RafaelC\Desktop\IPT\PSI\10168991_10201862911441260_793598979_n.jpg"/>
           <p:cNvPicPr>
             <a:picLocks noChangeAspect="1" noChangeArrowheads="1"/>
           </p:cNvPicPr>
           <p:nvPr/>
         </p:nvPicPr>
         <p:blipFill>
-          <a:blip r:embed="rId4" cstate="print"/>
+          <a:blip r:embed="rId2">
+            <a:extLst>
+              <a:ext uri="{28A0092B-C50C-407E-A947-70E740481C1C}">
+                <a14:useLocalDpi xmlns:a14="http://schemas.microsoft.com/office/drawing/2010/main" val="0"/>
+              </a:ext>
+            </a:extLst>
+          </a:blip>
           <a:srcRect/>
           <a:stretch>
             <a:fillRect/>
@@ -5561,45 +5353,65 @@
         </p:blipFill>
         <p:spPr bwMode="auto">
           <a:xfrm>
-            <a:off x="5940153" y="1484783"/>
-            <a:ext cx="2601010" cy="4335017"/>
+            <a:off x="5338072" y="1568569"/>
+            <a:ext cx="2540257" cy="4049756"/>
           </a:xfrm>
           <a:prstGeom prst="rect">
             <a:avLst/>
           </a:prstGeom>
           <a:noFill/>
+          <a:extLst>
+            <a:ext uri="{909E8E84-426E-40DD-AFC4-6F175D3DCCD1}">
+              <a14:hiddenFill xmlns:a14="http://schemas.microsoft.com/office/drawing/2010/main">
+                <a:solidFill>
+                  <a:srgbClr val="FFFFFF"/>
+                </a:solidFill>
+              </a14:hiddenFill>
+            </a:ext>
+          </a:extLst>
         </p:spPr>
       </p:pic>
-      <p:sp>
-        <p:nvSpPr>
-          <p:cNvPr id="10" name="TextBox 9"/>
-          <p:cNvSpPr txBox="1"/>
+      <p:pic>
+        <p:nvPicPr>
+          <p:cNvPr id="1029" name="Picture 5" descr="C:\Users\RafaelC\Desktop\IPT\PSI\10168488_10201862911401259_1659587179_n.jpg"/>
+          <p:cNvPicPr>
+            <a:picLocks noChangeAspect="1" noChangeArrowheads="1"/>
+          </p:cNvPicPr>
           <p:nvPr/>
-        </p:nvSpPr>
-        <p:spPr>
-          <a:xfrm>
-            <a:off x="539552" y="5949280"/>
-            <a:ext cx="5693418" cy="369332"/>
+        </p:nvPicPr>
+        <p:blipFill>
+          <a:blip r:embed="rId3">
+            <a:extLst>
+              <a:ext uri="{28A0092B-C50C-407E-A947-70E740481C1C}">
+                <a14:useLocalDpi xmlns:a14="http://schemas.microsoft.com/office/drawing/2010/main" val="0"/>
+              </a:ext>
+            </a:extLst>
+          </a:blip>
+          <a:srcRect/>
+          <a:stretch>
+            <a:fillRect/>
+          </a:stretch>
+        </p:blipFill>
+        <p:spPr bwMode="auto">
+          <a:xfrm>
+            <a:off x="1259632" y="1596978"/>
+            <a:ext cx="2540257" cy="4074677"/>
           </a:xfrm>
           <a:prstGeom prst="rect">
             <a:avLst/>
           </a:prstGeom>
           <a:noFill/>
-        </p:spPr>
-        <p:txBody>
-          <a:bodyPr wrap="none" rtlCol="0">
-            <a:spAutoFit/>
-          </a:bodyPr>
-          <a:lstStyle/>
-          <a:p>
-            <a:r>
-              <a:rPr lang="pt-PT" dirty="0" smtClean="0"/>
-              <a:t>Selecionar palavras lidas incorretamente pelo aluno</a:t>
-            </a:r>
-            <a:endParaRPr lang="pt-PT" dirty="0"/>
-          </a:p>
-        </p:txBody>
-      </p:sp>
+          <a:extLst>
+            <a:ext uri="{909E8E84-426E-40DD-AFC4-6F175D3DCCD1}">
+              <a14:hiddenFill xmlns:a14="http://schemas.microsoft.com/office/drawing/2010/main">
+                <a:solidFill>
+                  <a:srgbClr val="FFFFFF"/>
+                </a:solidFill>
+              </a14:hiddenFill>
+            </a:ext>
+          </a:extLst>
+        </p:spPr>
+      </p:pic>
     </p:spTree>
   </p:cSld>
   <p:clrMapOvr>
@@ -5634,7 +5446,127 @@
       </p:grpSpPr>
       <p:sp>
         <p:nvSpPr>
-          <p:cNvPr id="2" name="Title 1"/>
+          <p:cNvPr id="4" name="TextBox 3"/>
+          <p:cNvSpPr txBox="1"/>
+          <p:nvPr/>
+        </p:nvSpPr>
+        <p:spPr>
+          <a:xfrm>
+            <a:off x="683568" y="1578272"/>
+            <a:ext cx="7128792" cy="4708981"/>
+          </a:xfrm>
+          <a:prstGeom prst="rect">
+            <a:avLst/>
+          </a:prstGeom>
+          <a:noFill/>
+        </p:spPr>
+        <p:txBody>
+          <a:bodyPr wrap="square" rtlCol="0">
+            <a:spAutoFit/>
+          </a:bodyPr>
+          <a:lstStyle/>
+          <a:p>
+            <a:endParaRPr lang="pt-PT" dirty="0" smtClean="0"/>
+          </a:p>
+          <a:p>
+            <a:pPr>
+              <a:buFont typeface="Arial" pitchFamily="34" charset="0"/>
+              <a:buChar char="•"/>
+            </a:pPr>
+            <a:r>
+              <a:rPr lang="pt-PT" sz="2400" dirty="0" smtClean="0"/>
+              <a:t> Mais tipos de testes</a:t>
+            </a:r>
+          </a:p>
+          <a:p>
+            <a:pPr>
+              <a:buFont typeface="Arial" pitchFamily="34" charset="0"/>
+              <a:buChar char="•"/>
+            </a:pPr>
+            <a:r>
+              <a:rPr lang="pt-PT" sz="2400" dirty="0" smtClean="0"/>
+              <a:t>Sincronização das BD’s</a:t>
+            </a:r>
+          </a:p>
+          <a:p>
+            <a:pPr>
+              <a:buFont typeface="Arial" pitchFamily="34" charset="0"/>
+              <a:buChar char="•"/>
+            </a:pPr>
+            <a:r>
+              <a:rPr lang="pt-PT" sz="2400" dirty="0" smtClean="0"/>
+              <a:t>Guradar testes na BD Android</a:t>
+            </a:r>
+          </a:p>
+          <a:p>
+            <a:pPr>
+              <a:buFont typeface="Arial" pitchFamily="34" charset="0"/>
+              <a:buChar char="•"/>
+            </a:pPr>
+            <a:r>
+              <a:rPr lang="pt-PT" sz="2400" dirty="0" smtClean="0"/>
+              <a:t>Guardar resolução dos testes no Android</a:t>
+            </a:r>
+          </a:p>
+          <a:p>
+            <a:pPr>
+              <a:buFont typeface="Arial" pitchFamily="34" charset="0"/>
+              <a:buChar char="•"/>
+            </a:pPr>
+            <a:r>
+              <a:rPr lang="pt-PT" sz="2400" dirty="0" smtClean="0"/>
+              <a:t>Aceder as resoluções dos testes efectuados pelos alunos em modo professor</a:t>
+            </a:r>
+          </a:p>
+          <a:p>
+            <a:pPr>
+              <a:buFont typeface="Arial" pitchFamily="34" charset="0"/>
+              <a:buChar char="•"/>
+            </a:pPr>
+            <a:r>
+              <a:rPr lang="pt-PT" sz="2400" dirty="0" smtClean="0"/>
+              <a:t>Desenvolver uma classe para o calculo de avaliação</a:t>
+            </a:r>
+          </a:p>
+          <a:p>
+            <a:pPr>
+              <a:buFont typeface="Arial" pitchFamily="34" charset="0"/>
+              <a:buChar char="•"/>
+            </a:pPr>
+            <a:r>
+              <a:rPr lang="pt-PT" sz="2400" dirty="0" smtClean="0"/>
+              <a:t>Autenticação</a:t>
+            </a:r>
+          </a:p>
+          <a:p>
+            <a:pPr>
+              <a:buFont typeface="Arial" pitchFamily="34" charset="0"/>
+              <a:buChar char="•"/>
+            </a:pPr>
+            <a:r>
+              <a:rPr lang="pt-PT" sz="2400" dirty="0" smtClean="0"/>
+              <a:t>…</a:t>
+            </a:r>
+          </a:p>
+          <a:p>
+            <a:pPr>
+              <a:buFont typeface="Arial" pitchFamily="34" charset="0"/>
+              <a:buChar char="•"/>
+            </a:pPr>
+            <a:endParaRPr lang="pt-PT" sz="2400" dirty="0" smtClean="0"/>
+          </a:p>
+          <a:p>
+            <a:pPr>
+              <a:buFont typeface="Arial" pitchFamily="34" charset="0"/>
+              <a:buChar char="•"/>
+            </a:pPr>
+            <a:endParaRPr lang="pt-PT" dirty="0"/>
+          </a:p>
+        </p:txBody>
+      </p:sp>
+      <p:sp>
+        <p:nvSpPr>
+          <p:cNvPr id="5" name="Title 1"/>
           <p:cNvSpPr>
             <a:spLocks noGrp="1"/>
           </p:cNvSpPr>
@@ -5642,7 +5574,12 @@
             <p:ph type="title"/>
           </p:nvPr>
         </p:nvSpPr>
-        <p:spPr/>
+        <p:spPr>
+          <a:xfrm>
+            <a:off x="457200" y="253536"/>
+            <a:ext cx="8229600" cy="1143000"/>
+          </a:xfrm>
+        </p:spPr>
         <p:txBody>
           <a:bodyPr>
             <a:normAutofit fontScale="90000"/>
@@ -5651,113 +5588,7 @@
           <a:p>
             <a:r>
               <a:rPr lang="pt-PT" dirty="0" smtClean="0"/>
-              <a:t>Realização do teste em modo professor</a:t>
-            </a:r>
-            <a:endParaRPr lang="pt-PT" dirty="0"/>
-          </a:p>
-        </p:txBody>
-      </p:sp>
-      <p:pic>
-        <p:nvPicPr>
-          <p:cNvPr id="4" name="Picture 3" descr="Screenshot_2014-04-10-17-56-11.png"/>
-          <p:cNvPicPr>
-            <a:picLocks noChangeAspect="1"/>
-          </p:cNvPicPr>
-          <p:nvPr/>
-        </p:nvPicPr>
-        <p:blipFill>
-          <a:blip r:embed="rId2" cstate="print"/>
-          <a:stretch>
-            <a:fillRect/>
-          </a:stretch>
-        </p:blipFill>
-        <p:spPr>
-          <a:xfrm>
-            <a:off x="6012160" y="1484784"/>
-            <a:ext cx="2664296" cy="4440493"/>
-          </a:xfrm>
-          <a:prstGeom prst="rect">
-            <a:avLst/>
-          </a:prstGeom>
-        </p:spPr>
-      </p:pic>
-      <p:pic>
-        <p:nvPicPr>
-          <p:cNvPr id="2050" name="Picture 2" descr="C:\Users\DiogoNetoConceição\estt\PSI\ApresentaçãoApp0.2\printScreens0.2\Screenshot_2014-04-10-15-27-11.png"/>
-          <p:cNvPicPr>
-            <a:picLocks noChangeAspect="1" noChangeArrowheads="1"/>
-          </p:cNvPicPr>
-          <p:nvPr/>
-        </p:nvPicPr>
-        <p:blipFill>
-          <a:blip r:embed="rId3" cstate="print"/>
-          <a:srcRect/>
-          <a:stretch>
-            <a:fillRect/>
-          </a:stretch>
-        </p:blipFill>
-        <p:spPr bwMode="auto">
-          <a:xfrm>
-            <a:off x="539552" y="1484783"/>
-            <a:ext cx="2664296" cy="4440493"/>
-          </a:xfrm>
-          <a:prstGeom prst="rect">
-            <a:avLst/>
-          </a:prstGeom>
-          <a:noFill/>
-        </p:spPr>
-      </p:pic>
-      <p:pic>
-        <p:nvPicPr>
-          <p:cNvPr id="2051" name="Picture 3" descr="C:\Users\DiogoNetoConceição\estt\PSI\ApresentaçãoApp0.2\printScreens0.2\Screenshot_2014-04-10-15-27-18.png"/>
-          <p:cNvPicPr>
-            <a:picLocks noChangeAspect="1" noChangeArrowheads="1"/>
-          </p:cNvPicPr>
-          <p:nvPr/>
-        </p:nvPicPr>
-        <p:blipFill>
-          <a:blip r:embed="rId4" cstate="print"/>
-          <a:srcRect/>
-          <a:stretch>
-            <a:fillRect/>
-          </a:stretch>
-        </p:blipFill>
-        <p:spPr bwMode="auto">
-          <a:xfrm>
-            <a:off x="3275856" y="1484784"/>
-            <a:ext cx="2664296" cy="4440495"/>
-          </a:xfrm>
-          <a:prstGeom prst="rect">
-            <a:avLst/>
-          </a:prstGeom>
-          <a:noFill/>
-        </p:spPr>
-      </p:pic>
-      <p:sp>
-        <p:nvSpPr>
-          <p:cNvPr id="7" name="TextBox 6"/>
-          <p:cNvSpPr txBox="1"/>
-          <p:nvPr/>
-        </p:nvSpPr>
-        <p:spPr>
-          <a:xfrm>
-            <a:off x="683568" y="6021288"/>
-            <a:ext cx="6334106" cy="369332"/>
-          </a:xfrm>
-          <a:prstGeom prst="rect">
-            <a:avLst/>
-          </a:prstGeom>
-          <a:noFill/>
-        </p:spPr>
-        <p:txBody>
-          <a:bodyPr wrap="none" rtlCol="0">
-            <a:spAutoFit/>
-          </a:bodyPr>
-          <a:lstStyle/>
-          <a:p>
-            <a:r>
-              <a:rPr lang="pt-PT" dirty="0" smtClean="0"/>
-              <a:t>Atribuir classificação de dificuldade de leitura às palavras</a:t>
+              <a:t>Funcionalidades para concluir e desenvolver para a versão 0.3</a:t>
             </a:r>
             <a:endParaRPr lang="pt-PT" dirty="0"/>
           </a:p>

</xml_diff>

<commit_message>
Adicionei imagens na parte da Realização do teste em modo Professor e também envio o código ..
</commit_message>
<xml_diff>
--- a/Letrinhas 0.2.pptx
+++ b/Letrinhas 0.2.pptx
@@ -5,7 +5,7 @@
     <p:sldMasterId id="2147483804" r:id="rId1"/>
   </p:sldMasterIdLst>
   <p:notesMasterIdLst>
-    <p:notesMasterId r:id="rId11"/>
+    <p:notesMasterId r:id="rId12"/>
   </p:notesMasterIdLst>
   <p:sldIdLst>
     <p:sldId id="256" r:id="rId2"/>
@@ -16,7 +16,8 @@
     <p:sldId id="263" r:id="rId7"/>
     <p:sldId id="259" r:id="rId8"/>
     <p:sldId id="265" r:id="rId9"/>
-    <p:sldId id="266" r:id="rId10"/>
+    <p:sldId id="270" r:id="rId10"/>
+    <p:sldId id="266" r:id="rId11"/>
   </p:sldIdLst>
   <p:sldSz cx="9144000" cy="6858000" type="screen4x3"/>
   <p:notesSz cx="6858000" cy="9144000"/>
@@ -115,6 +116,22 @@
       </a:defRPr>
     </a:lvl9pPr>
   </p:defaultTextStyle>
+  <p:extLst>
+    <p:ext uri="{EFAFB233-063F-42B5-8137-9DF3F51BA10A}">
+      <p15:sldGuideLst xmlns:p15="http://schemas.microsoft.com/office/powerpoint/2012/main">
+        <p15:guide id="1" orient="horz" pos="2160">
+          <p15:clr>
+            <a:srgbClr val="A4A3A4"/>
+          </p15:clr>
+        </p15:guide>
+        <p15:guide id="2" pos="2880">
+          <p15:clr>
+            <a:srgbClr val="A4A3A4"/>
+          </p15:clr>
+        </p15:guide>
+      </p15:sldGuideLst>
+    </p:ext>
+  </p:extLst>
 </p:presentation>
 </file>
 
@@ -544,6 +561,11 @@
         </p:txBody>
       </p:sp>
     </p:spTree>
+    <p:extLst>
+      <p:ext uri="{BB962C8B-B14F-4D97-AF65-F5344CB8AC3E}">
+        <p14:creationId xmlns:p14="http://schemas.microsoft.com/office/powerpoint/2010/main" val="942315971"/>
+      </p:ext>
+    </p:extLst>
   </p:cSld>
   <p:clrMapOvr>
     <a:masterClrMapping/>
@@ -4300,6 +4322,188 @@
 </p:sld>
 </file>
 
+<file path=ppt/slides/slide10.xml><?xml version="1.0" encoding="utf-8"?>
+<p:sld xmlns:a="http://schemas.openxmlformats.org/drawingml/2006/main" xmlns:r="http://schemas.openxmlformats.org/officeDocument/2006/relationships" xmlns:p="http://schemas.openxmlformats.org/presentationml/2006/main">
+  <p:cSld>
+    <p:spTree>
+      <p:nvGrpSpPr>
+        <p:cNvPr id="1" name=""/>
+        <p:cNvGrpSpPr/>
+        <p:nvPr/>
+      </p:nvGrpSpPr>
+      <p:grpSpPr>
+        <a:xfrm>
+          <a:off x="0" y="0"/>
+          <a:ext cx="0" cy="0"/>
+          <a:chOff x="0" y="0"/>
+          <a:chExt cx="0" cy="0"/>
+        </a:xfrm>
+      </p:grpSpPr>
+      <p:sp>
+        <p:nvSpPr>
+          <p:cNvPr id="4" name="TextBox 3"/>
+          <p:cNvSpPr txBox="1"/>
+          <p:nvPr/>
+        </p:nvSpPr>
+        <p:spPr>
+          <a:xfrm>
+            <a:off x="683568" y="1578272"/>
+            <a:ext cx="7128792" cy="4708981"/>
+          </a:xfrm>
+          <a:prstGeom prst="rect">
+            <a:avLst/>
+          </a:prstGeom>
+          <a:noFill/>
+        </p:spPr>
+        <p:txBody>
+          <a:bodyPr wrap="square" rtlCol="0">
+            <a:spAutoFit/>
+          </a:bodyPr>
+          <a:lstStyle/>
+          <a:p>
+            <a:endParaRPr lang="pt-PT" dirty="0" smtClean="0"/>
+          </a:p>
+          <a:p>
+            <a:pPr>
+              <a:buFont typeface="Arial" pitchFamily="34" charset="0"/>
+              <a:buChar char="•"/>
+            </a:pPr>
+            <a:r>
+              <a:rPr lang="pt-PT" sz="2400" dirty="0" smtClean="0"/>
+              <a:t> Mais tipos de testes</a:t>
+            </a:r>
+          </a:p>
+          <a:p>
+            <a:pPr>
+              <a:buFont typeface="Arial" pitchFamily="34" charset="0"/>
+              <a:buChar char="•"/>
+            </a:pPr>
+            <a:r>
+              <a:rPr lang="pt-PT" sz="2400" dirty="0" smtClean="0"/>
+              <a:t>Sincronização das BD’s</a:t>
+            </a:r>
+          </a:p>
+          <a:p>
+            <a:pPr>
+              <a:buFont typeface="Arial" pitchFamily="34" charset="0"/>
+              <a:buChar char="•"/>
+            </a:pPr>
+            <a:r>
+              <a:rPr lang="pt-PT" sz="2400" dirty="0" smtClean="0"/>
+              <a:t>Guradar testes na BD Android</a:t>
+            </a:r>
+          </a:p>
+          <a:p>
+            <a:pPr>
+              <a:buFont typeface="Arial" pitchFamily="34" charset="0"/>
+              <a:buChar char="•"/>
+            </a:pPr>
+            <a:r>
+              <a:rPr lang="pt-PT" sz="2400" dirty="0" smtClean="0"/>
+              <a:t>Guardar resolução dos testes no Android</a:t>
+            </a:r>
+          </a:p>
+          <a:p>
+            <a:pPr>
+              <a:buFont typeface="Arial" pitchFamily="34" charset="0"/>
+              <a:buChar char="•"/>
+            </a:pPr>
+            <a:r>
+              <a:rPr lang="pt-PT" sz="2400" dirty="0" smtClean="0"/>
+              <a:t>Aceder as resoluções dos testes efectuados pelos alunos em modo professor</a:t>
+            </a:r>
+          </a:p>
+          <a:p>
+            <a:pPr>
+              <a:buFont typeface="Arial" pitchFamily="34" charset="0"/>
+              <a:buChar char="•"/>
+            </a:pPr>
+            <a:r>
+              <a:rPr lang="pt-PT" sz="2400" dirty="0" smtClean="0"/>
+              <a:t>Desenvolver uma classe para o calculo de avaliação</a:t>
+            </a:r>
+          </a:p>
+          <a:p>
+            <a:pPr>
+              <a:buFont typeface="Arial" pitchFamily="34" charset="0"/>
+              <a:buChar char="•"/>
+            </a:pPr>
+            <a:r>
+              <a:rPr lang="pt-PT" sz="2400" dirty="0" smtClean="0"/>
+              <a:t>Autenticação</a:t>
+            </a:r>
+          </a:p>
+          <a:p>
+            <a:pPr>
+              <a:buFont typeface="Arial" pitchFamily="34" charset="0"/>
+              <a:buChar char="•"/>
+            </a:pPr>
+            <a:r>
+              <a:rPr lang="pt-PT" sz="2400" dirty="0" smtClean="0"/>
+              <a:t>…</a:t>
+            </a:r>
+          </a:p>
+          <a:p>
+            <a:pPr>
+              <a:buFont typeface="Arial" pitchFamily="34" charset="0"/>
+              <a:buChar char="•"/>
+            </a:pPr>
+            <a:endParaRPr lang="pt-PT" sz="2400" dirty="0" smtClean="0"/>
+          </a:p>
+          <a:p>
+            <a:pPr>
+              <a:buFont typeface="Arial" pitchFamily="34" charset="0"/>
+              <a:buChar char="•"/>
+            </a:pPr>
+            <a:endParaRPr lang="pt-PT" dirty="0"/>
+          </a:p>
+        </p:txBody>
+      </p:sp>
+      <p:sp>
+        <p:nvSpPr>
+          <p:cNvPr id="5" name="Title 1"/>
+          <p:cNvSpPr>
+            <a:spLocks noGrp="1"/>
+          </p:cNvSpPr>
+          <p:nvPr>
+            <p:ph type="title"/>
+          </p:nvPr>
+        </p:nvSpPr>
+        <p:spPr>
+          <a:xfrm>
+            <a:off x="457200" y="253536"/>
+            <a:ext cx="8229600" cy="1143000"/>
+          </a:xfrm>
+        </p:spPr>
+        <p:txBody>
+          <a:bodyPr>
+            <a:normAutofit fontScale="90000"/>
+          </a:bodyPr>
+          <a:lstStyle/>
+          <a:p>
+            <a:r>
+              <a:rPr lang="pt-PT" dirty="0" smtClean="0"/>
+              <a:t>Funcionalidades para concluir e desenvolver para a versão 0.3</a:t>
+            </a:r>
+            <a:endParaRPr lang="pt-PT" dirty="0"/>
+          </a:p>
+        </p:txBody>
+      </p:sp>
+    </p:spTree>
+  </p:cSld>
+  <p:clrMapOvr>
+    <a:masterClrMapping/>
+  </p:clrMapOvr>
+  <p:timing>
+    <p:tnLst>
+      <p:par>
+        <p:cTn id="1" dur="indefinite" restart="never" nodeType="tmRoot"/>
+      </p:par>
+    </p:tnLst>
+  </p:timing>
+</p:sld>
+</file>
+
 <file path=ppt/slides/slide2.xml><?xml version="1.0" encoding="utf-8"?>
 <p:sld xmlns:a="http://schemas.openxmlformats.org/drawingml/2006/main" xmlns:r="http://schemas.openxmlformats.org/officeDocument/2006/relationships" xmlns:p="http://schemas.openxmlformats.org/presentationml/2006/main">
   <p:cSld>
@@ -5285,56 +5489,31 @@
             <p:ph type="title"/>
           </p:nvPr>
         </p:nvSpPr>
-        <p:spPr/>
+        <p:spPr>
+          <a:xfrm>
+            <a:off x="-468560" y="253536"/>
+            <a:ext cx="9155360" cy="1143000"/>
+          </a:xfrm>
+        </p:spPr>
         <p:txBody>
           <a:bodyPr>
-            <a:normAutofit fontScale="90000"/>
+            <a:noAutofit/>
           </a:bodyPr>
           <a:lstStyle/>
           <a:p>
             <a:r>
-              <a:rPr lang="pt-PT" dirty="0" smtClean="0"/>
+              <a:rPr lang="pt-PT" sz="4000" dirty="0" smtClean="0"/>
               <a:t>Realização do teste em modo professor</a:t>
             </a:r>
-            <a:endParaRPr lang="pt-PT" dirty="0"/>
-          </a:p>
-        </p:txBody>
-      </p:sp>
-      <p:sp>
-        <p:nvSpPr>
-          <p:cNvPr id="10" name="TextBox 9"/>
-          <p:cNvSpPr txBox="1"/>
-          <p:nvPr/>
-        </p:nvSpPr>
-        <p:spPr>
-          <a:xfrm>
-            <a:off x="539552" y="5949280"/>
-            <a:ext cx="5693418" cy="369332"/>
-          </a:xfrm>
-          <a:prstGeom prst="rect">
-            <a:avLst/>
-          </a:prstGeom>
-          <a:noFill/>
-        </p:spPr>
-        <p:txBody>
-          <a:bodyPr wrap="none" rtlCol="0">
-            <a:spAutoFit/>
-          </a:bodyPr>
-          <a:lstStyle/>
-          <a:p>
-            <a:r>
-              <a:rPr lang="pt-PT" dirty="0" smtClean="0"/>
-              <a:t>Selecionar palavras lidas incorretamente pelo aluno</a:t>
-            </a:r>
-            <a:endParaRPr lang="pt-PT" dirty="0"/>
+            <a:endParaRPr lang="pt-PT" sz="4000" dirty="0"/>
           </a:p>
         </p:txBody>
       </p:sp>
       <p:pic>
         <p:nvPicPr>
-          <p:cNvPr id="1028" name="Picture 4" descr="C:\Users\RafaelC\Desktop\IPT\PSI\10168991_10201862911441260_793598979_n.jpg"/>
+          <p:cNvPr id="2" name="Imagem 1"/>
           <p:cNvPicPr>
-            <a:picLocks noChangeAspect="1" noChangeArrowheads="1"/>
+            <a:picLocks noChangeAspect="1"/>
           </p:cNvPicPr>
           <p:nvPr/>
         </p:nvPicPr>
@@ -5346,36 +5525,25 @@
               </a:ext>
             </a:extLst>
           </a:blip>
-          <a:srcRect/>
           <a:stretch>
             <a:fillRect/>
           </a:stretch>
         </p:blipFill>
-        <p:spPr bwMode="auto">
-          <a:xfrm>
-            <a:off x="5338072" y="1568569"/>
-            <a:ext cx="2540257" cy="4049756"/>
+        <p:spPr>
+          <a:xfrm>
+            <a:off x="1259632" y="1588650"/>
+            <a:ext cx="2462673" cy="4104456"/>
           </a:xfrm>
           <a:prstGeom prst="rect">
             <a:avLst/>
           </a:prstGeom>
-          <a:noFill/>
-          <a:extLst>
-            <a:ext uri="{909E8E84-426E-40DD-AFC4-6F175D3DCCD1}">
-              <a14:hiddenFill xmlns:a14="http://schemas.microsoft.com/office/drawing/2010/main">
-                <a:solidFill>
-                  <a:srgbClr val="FFFFFF"/>
-                </a:solidFill>
-              </a14:hiddenFill>
-            </a:ext>
-          </a:extLst>
         </p:spPr>
       </p:pic>
       <p:pic>
         <p:nvPicPr>
-          <p:cNvPr id="1029" name="Picture 5" descr="C:\Users\RafaelC\Desktop\IPT\PSI\10168488_10201862911401259_1659587179_n.jpg"/>
+          <p:cNvPr id="3" name="Imagem 2"/>
           <p:cNvPicPr>
-            <a:picLocks noChangeAspect="1" noChangeArrowheads="1"/>
+            <a:picLocks noChangeAspect="1"/>
           </p:cNvPicPr>
           <p:nvPr/>
         </p:nvPicPr>
@@ -5387,31 +5555,82 @@
               </a:ext>
             </a:extLst>
           </a:blip>
-          <a:srcRect/>
           <a:stretch>
             <a:fillRect/>
           </a:stretch>
         </p:blipFill>
-        <p:spPr bwMode="auto">
-          <a:xfrm>
-            <a:off x="1259632" y="1596978"/>
-            <a:ext cx="2540257" cy="4074677"/>
+        <p:spPr>
+          <a:xfrm>
+            <a:off x="5292080" y="1588650"/>
+            <a:ext cx="2424237" cy="4040396"/>
+          </a:xfrm>
+          <a:prstGeom prst="rect">
+            <a:avLst/>
+          </a:prstGeom>
+        </p:spPr>
+      </p:pic>
+      <p:sp>
+        <p:nvSpPr>
+          <p:cNvPr id="11" name="TextBox 9"/>
+          <p:cNvSpPr txBox="1"/>
+          <p:nvPr/>
+        </p:nvSpPr>
+        <p:spPr>
+          <a:xfrm>
+            <a:off x="1489250" y="5866316"/>
+            <a:ext cx="2003434" cy="369332"/>
           </a:xfrm>
           <a:prstGeom prst="rect">
             <a:avLst/>
           </a:prstGeom>
           <a:noFill/>
-          <a:extLst>
-            <a:ext uri="{909E8E84-426E-40DD-AFC4-6F175D3DCCD1}">
-              <a14:hiddenFill xmlns:a14="http://schemas.microsoft.com/office/drawing/2010/main">
-                <a:solidFill>
-                  <a:srgbClr val="FFFFFF"/>
-                </a:solidFill>
-              </a14:hiddenFill>
-            </a:ext>
-          </a:extLst>
-        </p:spPr>
-      </p:pic>
+        </p:spPr>
+        <p:txBody>
+          <a:bodyPr wrap="none" rtlCol="0">
+            <a:spAutoFit/>
+          </a:bodyPr>
+          <a:lstStyle/>
+          <a:p>
+            <a:pPr algn="ctr"/>
+            <a:r>
+              <a:rPr lang="pt-PT" dirty="0" smtClean="0"/>
+              <a:t>Menu de Seleção</a:t>
+            </a:r>
+            <a:endParaRPr lang="pt-PT" dirty="0"/>
+          </a:p>
+        </p:txBody>
+      </p:sp>
+      <p:sp>
+        <p:nvSpPr>
+          <p:cNvPr id="12" name="TextBox 9"/>
+          <p:cNvSpPr txBox="1"/>
+          <p:nvPr/>
+        </p:nvSpPr>
+        <p:spPr>
+          <a:xfrm>
+            <a:off x="4953554" y="5821160"/>
+            <a:ext cx="3282502" cy="369332"/>
+          </a:xfrm>
+          <a:prstGeom prst="rect">
+            <a:avLst/>
+          </a:prstGeom>
+          <a:noFill/>
+        </p:spPr>
+        <p:txBody>
+          <a:bodyPr wrap="none" rtlCol="0">
+            <a:spAutoFit/>
+          </a:bodyPr>
+          <a:lstStyle/>
+          <a:p>
+            <a:pPr algn="ctr"/>
+            <a:r>
+              <a:rPr lang="pt-PT" dirty="0" smtClean="0"/>
+              <a:t>Selecionar palavras incorreta</a:t>
+            </a:r>
+            <a:endParaRPr lang="pt-PT" dirty="0"/>
+          </a:p>
+        </p:txBody>
+      </p:sp>
     </p:spTree>
   </p:cSld>
   <p:clrMapOvr>
@@ -5446,14 +5665,39 @@
       </p:grpSpPr>
       <p:sp>
         <p:nvSpPr>
-          <p:cNvPr id="4" name="TextBox 3"/>
+          <p:cNvPr id="4" name="Title 1"/>
+          <p:cNvSpPr>
+            <a:spLocks noGrp="1"/>
+          </p:cNvSpPr>
+          <p:nvPr>
+            <p:ph type="title"/>
+          </p:nvPr>
+        </p:nvSpPr>
+        <p:spPr/>
+        <p:txBody>
+          <a:bodyPr>
+            <a:normAutofit fontScale="90000"/>
+          </a:bodyPr>
+          <a:lstStyle/>
+          <a:p>
+            <a:r>
+              <a:rPr lang="pt-PT" dirty="0" smtClean="0"/>
+              <a:t>Realização do teste em modo professor</a:t>
+            </a:r>
+            <a:endParaRPr lang="pt-PT" dirty="0"/>
+          </a:p>
+        </p:txBody>
+      </p:sp>
+      <p:sp>
+        <p:nvSpPr>
+          <p:cNvPr id="10" name="TextBox 9"/>
           <p:cNvSpPr txBox="1"/>
           <p:nvPr/>
         </p:nvSpPr>
         <p:spPr>
           <a:xfrm>
-            <a:off x="683568" y="1578272"/>
-            <a:ext cx="7128792" cy="4708981"/>
+            <a:off x="833381" y="5672417"/>
+            <a:ext cx="2765885" cy="646331"/>
           </a:xfrm>
           <a:prstGeom prst="rect">
             <a:avLst/>
@@ -5461,140 +5705,131 @@
           <a:noFill/>
         </p:spPr>
         <p:txBody>
-          <a:bodyPr wrap="square" rtlCol="0">
+          <a:bodyPr wrap="none" rtlCol="0">
             <a:spAutoFit/>
           </a:bodyPr>
           <a:lstStyle/>
           <a:p>
-            <a:endParaRPr lang="pt-PT" dirty="0" smtClean="0"/>
-          </a:p>
-          <a:p>
-            <a:pPr>
-              <a:buFont typeface="Arial" pitchFamily="34" charset="0"/>
-              <a:buChar char="•"/>
-            </a:pPr>
-            <a:r>
-              <a:rPr lang="pt-PT" sz="2400" dirty="0" smtClean="0"/>
-              <a:t> Mais tipos de testes</a:t>
-            </a:r>
-          </a:p>
-          <a:p>
-            <a:pPr>
-              <a:buFont typeface="Arial" pitchFamily="34" charset="0"/>
-              <a:buChar char="•"/>
-            </a:pPr>
-            <a:r>
-              <a:rPr lang="pt-PT" sz="2400" dirty="0" smtClean="0"/>
-              <a:t>Sincronização das BD’s</a:t>
-            </a:r>
-          </a:p>
-          <a:p>
-            <a:pPr>
-              <a:buFont typeface="Arial" pitchFamily="34" charset="0"/>
-              <a:buChar char="•"/>
-            </a:pPr>
-            <a:r>
-              <a:rPr lang="pt-PT" sz="2400" dirty="0" smtClean="0"/>
-              <a:t>Guradar testes na BD Android</a:t>
-            </a:r>
-          </a:p>
-          <a:p>
-            <a:pPr>
-              <a:buFont typeface="Arial" pitchFamily="34" charset="0"/>
-              <a:buChar char="•"/>
-            </a:pPr>
-            <a:r>
-              <a:rPr lang="pt-PT" sz="2400" dirty="0" smtClean="0"/>
-              <a:t>Guardar resolução dos testes no Android</a:t>
-            </a:r>
-          </a:p>
-          <a:p>
-            <a:pPr>
-              <a:buFont typeface="Arial" pitchFamily="34" charset="0"/>
-              <a:buChar char="•"/>
-            </a:pPr>
-            <a:r>
-              <a:rPr lang="pt-PT" sz="2400" dirty="0" smtClean="0"/>
-              <a:t>Aceder as resoluções dos testes efectuados pelos alunos em modo professor</a:t>
-            </a:r>
-          </a:p>
-          <a:p>
-            <a:pPr>
-              <a:buFont typeface="Arial" pitchFamily="34" charset="0"/>
-              <a:buChar char="•"/>
-            </a:pPr>
-            <a:r>
-              <a:rPr lang="pt-PT" sz="2400" dirty="0" smtClean="0"/>
-              <a:t>Desenvolver uma classe para o calculo de avaliação</a:t>
-            </a:r>
-          </a:p>
-          <a:p>
-            <a:pPr>
-              <a:buFont typeface="Arial" pitchFamily="34" charset="0"/>
-              <a:buChar char="•"/>
-            </a:pPr>
-            <a:r>
-              <a:rPr lang="pt-PT" sz="2400" dirty="0" smtClean="0"/>
-              <a:t>Autenticação</a:t>
-            </a:r>
-          </a:p>
-          <a:p>
-            <a:pPr>
-              <a:buFont typeface="Arial" pitchFamily="34" charset="0"/>
-              <a:buChar char="•"/>
-            </a:pPr>
-            <a:r>
-              <a:rPr lang="pt-PT" sz="2400" dirty="0" smtClean="0"/>
-              <a:t>…</a:t>
-            </a:r>
-          </a:p>
-          <a:p>
-            <a:pPr>
-              <a:buFont typeface="Arial" pitchFamily="34" charset="0"/>
-              <a:buChar char="•"/>
-            </a:pPr>
-            <a:endParaRPr lang="pt-PT" sz="2400" dirty="0" smtClean="0"/>
-          </a:p>
-          <a:p>
-            <a:pPr>
-              <a:buFont typeface="Arial" pitchFamily="34" charset="0"/>
-              <a:buChar char="•"/>
-            </a:pPr>
+            <a:pPr algn="ctr"/>
+            <a:r>
+              <a:rPr lang="pt-PT" dirty="0" smtClean="0"/>
+              <a:t>Cancelar a palavra </a:t>
+            </a:r>
+            <a:br>
+              <a:rPr lang="pt-PT" dirty="0" smtClean="0"/>
+            </a:br>
+            <a:r>
+              <a:rPr lang="pt-PT" dirty="0" smtClean="0"/>
+              <a:t>marcada como incorreta</a:t>
+            </a:r>
             <a:endParaRPr lang="pt-PT" dirty="0"/>
           </a:p>
         </p:txBody>
       </p:sp>
-      <p:sp>
-        <p:nvSpPr>
-          <p:cNvPr id="5" name="Title 1"/>
-          <p:cNvSpPr>
-            <a:spLocks noGrp="1"/>
-          </p:cNvSpPr>
-          <p:nvPr>
-            <p:ph type="title"/>
-          </p:nvPr>
-        </p:nvSpPr>
-        <p:spPr>
-          <a:xfrm>
-            <a:off x="457200" y="253536"/>
-            <a:ext cx="8229600" cy="1143000"/>
-          </a:xfrm>
-        </p:spPr>
-        <p:txBody>
-          <a:bodyPr>
-            <a:normAutofit fontScale="90000"/>
+      <p:pic>
+        <p:nvPicPr>
+          <p:cNvPr id="2" name="Imagem 1"/>
+          <p:cNvPicPr>
+            <a:picLocks noChangeAspect="1"/>
+          </p:cNvPicPr>
+          <p:nvPr/>
+        </p:nvPicPr>
+        <p:blipFill>
+          <a:blip r:embed="rId2">
+            <a:extLst>
+              <a:ext uri="{28A0092B-C50C-407E-A947-70E740481C1C}">
+                <a14:useLocalDpi xmlns:a14="http://schemas.microsoft.com/office/drawing/2010/main" val="0"/>
+              </a:ext>
+            </a:extLst>
+          </a:blip>
+          <a:stretch>
+            <a:fillRect/>
+          </a:stretch>
+        </p:blipFill>
+        <p:spPr>
+          <a:xfrm>
+            <a:off x="971600" y="1518907"/>
+            <a:ext cx="2489448" cy="4149080"/>
+          </a:xfrm>
+          <a:prstGeom prst="rect">
+            <a:avLst/>
+          </a:prstGeom>
+        </p:spPr>
+      </p:pic>
+      <p:pic>
+        <p:nvPicPr>
+          <p:cNvPr id="3" name="Imagem 2"/>
+          <p:cNvPicPr>
+            <a:picLocks noChangeAspect="1"/>
+          </p:cNvPicPr>
+          <p:nvPr/>
+        </p:nvPicPr>
+        <p:blipFill>
+          <a:blip r:embed="rId3">
+            <a:extLst>
+              <a:ext uri="{28A0092B-C50C-407E-A947-70E740481C1C}">
+                <a14:useLocalDpi xmlns:a14="http://schemas.microsoft.com/office/drawing/2010/main" val="0"/>
+              </a:ext>
+            </a:extLst>
+          </a:blip>
+          <a:stretch>
+            <a:fillRect/>
+          </a:stretch>
+        </p:blipFill>
+        <p:spPr>
+          <a:xfrm>
+            <a:off x="5508104" y="1489835"/>
+            <a:ext cx="2506891" cy="4178152"/>
+          </a:xfrm>
+          <a:prstGeom prst="rect">
+            <a:avLst/>
+          </a:prstGeom>
+        </p:spPr>
+      </p:pic>
+      <p:sp>
+        <p:nvSpPr>
+          <p:cNvPr id="8" name="TextBox 9"/>
+          <p:cNvSpPr txBox="1"/>
+          <p:nvPr/>
+        </p:nvSpPr>
+        <p:spPr>
+          <a:xfrm>
+            <a:off x="5517004" y="5672416"/>
+            <a:ext cx="2700612" cy="646331"/>
+          </a:xfrm>
+          <a:prstGeom prst="rect">
+            <a:avLst/>
+          </a:prstGeom>
+          <a:noFill/>
+        </p:spPr>
+        <p:txBody>
+          <a:bodyPr wrap="none" rtlCol="0">
+            <a:spAutoFit/>
           </a:bodyPr>
           <a:lstStyle/>
           <a:p>
+            <a:pPr algn="ctr"/>
             <a:r>
               <a:rPr lang="pt-PT" dirty="0" smtClean="0"/>
-              <a:t>Funcionalidades para concluir e desenvolver para a versão 0.3</a:t>
+              <a:t>Cancelar palavra </a:t>
+            </a:r>
+            <a:br>
+              <a:rPr lang="pt-PT" dirty="0" smtClean="0"/>
+            </a:br>
+            <a:r>
+              <a:rPr lang="pt-PT" dirty="0" smtClean="0"/>
+              <a:t>sem palavras incorretas</a:t>
             </a:r>
             <a:endParaRPr lang="pt-PT" dirty="0"/>
           </a:p>
         </p:txBody>
       </p:sp>
     </p:spTree>
+    <p:extLst>
+      <p:ext uri="{BB962C8B-B14F-4D97-AF65-F5344CB8AC3E}">
+        <p14:creationId xmlns:p14="http://schemas.microsoft.com/office/powerpoint/2010/main" val="859075199"/>
+      </p:ext>
+    </p:extLst>
   </p:cSld>
   <p:clrMapOvr>
     <a:masterClrMapping/>

</xml_diff>